<commit_message>
presentación de intro de rbasico
</commit_message>
<xml_diff>
--- a/presentaciones/S01-New/00_Inicio.pptx
+++ b/presentaciones/S01-New/00_Inicio.pptx
@@ -9,6 +9,9 @@
     <p:sldId id="257" r:id="rId3"/>
     <p:sldId id="258" r:id="rId4"/>
     <p:sldId id="259" r:id="rId5"/>
+    <p:sldId id="260" r:id="rId6"/>
+    <p:sldId id="261" r:id="rId7"/>
+    <p:sldId id="262" r:id="rId8"/>
   </p:sldIdLst>
   <p:sldSz cx="12192000" cy="6858000"/>
   <p:notesSz cx="6858000" cy="9144000"/>
@@ -4205,7 +4208,7 @@
             </a:pPr>
             <a:r>
               <a:rPr/>
-              <a:t>Introducción Analisis de Datos</a:t>
+              <a:t>Introducción Análisis de Datos</a:t>
             </a:r>
           </a:p>
         </p:txBody>
@@ -4284,46 +4287,41 @@
             </a:pPr>
             <a:r>
               <a:rPr/>
-              <a:t>Bienvenidos</a:t>
-            </a:r>
-          </a:p>
-        </p:txBody>
-      </p:sp>
-      <p:sp>
-        <p:nvSpPr>
-          <p:cNvPr id="3" name="Content Placeholder 2"/>
-          <p:cNvSpPr>
-            <a:spLocks noGrp="1"/>
-          </p:cNvSpPr>
-          <p:nvPr>
-            <p:ph idx="1"/>
-          </p:nvPr>
-        </p:nvSpPr>
-        <p:spPr/>
-        <p:txBody>
-          <a:bodyPr/>
-          <a:lstStyle/>
-          <a:p>
-            <a:pPr lvl="0" indent="0" marL="0">
-              <a:buNone/>
-            </a:pPr>
-            <a:r>
-              <a:rPr/>
-              <a:t>Quarto enables you to weave together content and executable code into a finished presentation. To learn more about Quarto presentations see </a:t>
-            </a:r>
-            <a:r>
-              <a:rPr>
-                <a:hlinkClick r:id="rId2"/>
-              </a:rPr>
-              <a:t>https://quarto.org/docs/presentations/</a:t>
-            </a:r>
-            <a:r>
-              <a:rPr/>
-              <a:t>.</a:t>
-            </a:r>
-          </a:p>
-        </p:txBody>
-      </p:sp>
+              <a:t>Sobre está capacitación:</a:t>
+            </a:r>
+          </a:p>
+        </p:txBody>
+      </p:sp>
+      <p:pic>
+        <p:nvPicPr>
+          <p:cNvPr descr="imagen/DS01.png" id="0" name="Picture 1"/>
+          <p:cNvPicPr>
+            <a:picLocks noGrp="1" noChangeAspect="1"/>
+          </p:cNvPicPr>
+          <p:nvPr/>
+        </p:nvPicPr>
+        <p:blipFill>
+          <a:blip r:embed="rId2"/>
+          <a:stretch>
+            <a:fillRect/>
+          </a:stretch>
+        </p:blipFill>
+        <p:spPr bwMode="auto">
+          <a:xfrm>
+            <a:off x="2590800" y="1816100"/>
+            <a:ext cx="7010400" cy="4343400"/>
+          </a:xfrm>
+          <a:prstGeom prst="rect">
+            <a:avLst/>
+          </a:prstGeom>
+          <a:noFill/>
+          <a:ln w="9525">
+            <a:noFill/>
+            <a:headEnd/>
+            <a:tailEnd/>
+          </a:ln>
+        </p:spPr>
+      </p:pic>
     </p:spTree>
   </p:cSld>
 </p:sld>
@@ -4348,12 +4346,12 @@
       </p:grpSpPr>
       <p:sp>
         <p:nvSpPr>
-          <p:cNvPr id="2" name="Title 1"/>
-          <p:cNvSpPr>
-            <a:spLocks noGrp="1"/>
-          </p:cNvSpPr>
-          <p:nvPr>
-            <p:ph type="title"/>
+          <p:cNvPr id="3" name="Content Placeholder 2"/>
+          <p:cNvSpPr>
+            <a:spLocks noGrp="1"/>
+          </p:cNvSpPr>
+          <p:nvPr>
+            <p:ph idx="1"/>
           </p:nvPr>
         </p:nvSpPr>
         <p:spPr/>
@@ -4366,54 +4364,7 @@
             </a:pPr>
             <a:r>
               <a:rPr/>
-              <a:t>Bullets</a:t>
-            </a:r>
-          </a:p>
-        </p:txBody>
-      </p:sp>
-      <p:sp>
-        <p:nvSpPr>
-          <p:cNvPr id="3" name="Content Placeholder 2"/>
-          <p:cNvSpPr>
-            <a:spLocks noGrp="1"/>
-          </p:cNvSpPr>
-          <p:nvPr>
-            <p:ph idx="1"/>
-          </p:nvPr>
-        </p:nvSpPr>
-        <p:spPr/>
-        <p:txBody>
-          <a:bodyPr/>
-          <a:lstStyle/>
-          <a:p>
-            <a:pPr lvl="0" indent="0" marL="0">
-              <a:buNone/>
-            </a:pPr>
-            <a:r>
-              <a:rPr/>
-              <a:t>When you click the </a:t>
-            </a:r>
-            <a:r>
-              <a:rPr b="1"/>
-              <a:t>Render</a:t>
-            </a:r>
-            <a:r>
-              <a:rPr/>
-              <a:t> button a document will be generated that includes:</a:t>
-            </a:r>
-          </a:p>
-          <a:p>
-            <a:pPr lvl="0"/>
-            <a:r>
-              <a:rPr/>
-              <a:t>Content authored with markdown</a:t>
-            </a:r>
-          </a:p>
-          <a:p>
-            <a:pPr lvl="0"/>
-            <a:r>
-              <a:rPr/>
-              <a:t>Output from executable code</a:t>
+              <a:t>Generalmente los cursos, capacitaciones y seminarios se dan con el fin de tener una idea base en la cual el profesional se pueda desarrollar de un modo auto didáctico sobre la rama en la que tiene curiosidad o que conforma parte del desarrollo integral de su profesión.</a:t>
             </a:r>
           </a:p>
         </p:txBody>
@@ -4460,11 +4411,63 @@
             </a:pPr>
             <a:r>
               <a:rPr/>
-              <a:t>Code</a:t>
-            </a:r>
-          </a:p>
-        </p:txBody>
-      </p:sp>
+              <a:t>¿El ser humano es bueno para analizar datos?</a:t>
+            </a:r>
+          </a:p>
+        </p:txBody>
+      </p:sp>
+      <p:pic>
+        <p:nvPicPr>
+          <p:cNvPr descr="imagen/Analisis_Brain.jfif" id="0" name="Picture 1"/>
+          <p:cNvPicPr>
+            <a:picLocks noGrp="1" noChangeAspect="1"/>
+          </p:cNvPicPr>
+          <p:nvPr/>
+        </p:nvPicPr>
+        <p:blipFill>
+          <a:blip r:embed="rId2"/>
+          <a:stretch>
+            <a:fillRect/>
+          </a:stretch>
+        </p:blipFill>
+        <p:spPr bwMode="auto">
+          <a:xfrm>
+            <a:off x="3213100" y="1816100"/>
+            <a:ext cx="5765800" cy="4343400"/>
+          </a:xfrm>
+          <a:prstGeom prst="rect">
+            <a:avLst/>
+          </a:prstGeom>
+          <a:noFill/>
+          <a:ln w="9525">
+            <a:noFill/>
+            <a:headEnd/>
+            <a:tailEnd/>
+          </a:ln>
+        </p:spPr>
+      </p:pic>
+    </p:spTree>
+  </p:cSld>
+</p:sld>
+</file>
+
+<file path=ppt/slides/slide5.xml><?xml version="1.0" encoding="utf-8"?>
+<p:sld xmlns:a="http://schemas.openxmlformats.org/drawingml/2006/main" xmlns:r="http://schemas.openxmlformats.org/officeDocument/2006/relationships" xmlns:p="http://schemas.openxmlformats.org/presentationml/2006/main">
+  <p:cSld>
+    <p:spTree>
+      <p:nvGrpSpPr>
+        <p:cNvPr id="1" name=""/>
+        <p:cNvGrpSpPr/>
+        <p:nvPr/>
+      </p:nvGrpSpPr>
+      <p:grpSpPr>
+        <a:xfrm>
+          <a:off x="0" y="0"/>
+          <a:ext cx="0" cy="0"/>
+          <a:chOff x="0" y="0"/>
+          <a:chExt cx="0" cy="0"/>
+        </a:xfrm>
+      </p:grpSpPr>
       <p:sp>
         <p:nvSpPr>
           <p:cNvPr id="3" name="Content Placeholder 2"/>
@@ -4485,26 +4488,135 @@
             </a:pPr>
             <a:r>
               <a:rPr/>
-              <a:t>When you click the </a:t>
-            </a:r>
+              <a:t>La respuesta inicial es no, nuestro cerebro no es capaz de procesar identificar o agrupar volúmenes grandes de datos, segmentarlos, calcularlos y buscar fenómenos, patrones o inconsistencias en los mismos.</a:t>
+            </a:r>
+          </a:p>
+        </p:txBody>
+      </p:sp>
+    </p:spTree>
+  </p:cSld>
+</p:sld>
+</file>
+
+<file path=ppt/slides/slide6.xml><?xml version="1.0" encoding="utf-8"?>
+<p:sld xmlns:a="http://schemas.openxmlformats.org/drawingml/2006/main" xmlns:r="http://schemas.openxmlformats.org/officeDocument/2006/relationships" xmlns:p="http://schemas.openxmlformats.org/presentationml/2006/main">
+  <p:cSld>
+    <p:spTree>
+      <p:nvGrpSpPr>
+        <p:cNvPr id="1" name=""/>
+        <p:cNvGrpSpPr/>
+        <p:nvPr/>
+      </p:nvGrpSpPr>
+      <p:grpSpPr>
+        <a:xfrm>
+          <a:off x="0" y="0"/>
+          <a:ext cx="0" cy="0"/>
+          <a:chOff x="0" y="0"/>
+          <a:chExt cx="0" cy="0"/>
+        </a:xfrm>
+      </p:grpSpPr>
+      <p:sp>
+        <p:nvSpPr>
+          <p:cNvPr id="2" name="Title 1"/>
+          <p:cNvSpPr>
+            <a:spLocks noGrp="1"/>
+          </p:cNvSpPr>
+          <p:nvPr>
+            <p:ph type="title"/>
+          </p:nvPr>
+        </p:nvSpPr>
+        <p:spPr/>
+        <p:txBody>
+          <a:bodyPr/>
+          <a:lstStyle/>
+          <a:p>
+            <a:pPr lvl="0" indent="0" marL="0">
+              <a:buNone/>
+            </a:pPr>
+            <a:r>
+              <a:rPr/>
+              <a:t>¿Un analista de datos nace o se hace?</a:t>
+            </a:r>
+          </a:p>
+        </p:txBody>
+      </p:sp>
+      <p:pic>
+        <p:nvPicPr>
+          <p:cNvPr descr="imagen/Brain_02.jfif" id="0" name="Picture 1"/>
+          <p:cNvPicPr>
+            <a:picLocks noGrp="1" noChangeAspect="1"/>
+          </p:cNvPicPr>
+          <p:nvPr/>
+        </p:nvPicPr>
+        <p:blipFill>
+          <a:blip r:embed="rId2"/>
+          <a:stretch>
+            <a:fillRect/>
+          </a:stretch>
+        </p:blipFill>
+        <p:spPr bwMode="auto">
+          <a:xfrm>
+            <a:off x="2222500" y="1816100"/>
+            <a:ext cx="7759700" cy="4343400"/>
+          </a:xfrm>
+          <a:prstGeom prst="rect">
+            <a:avLst/>
+          </a:prstGeom>
+          <a:noFill/>
+          <a:ln w="9525">
+            <a:noFill/>
+            <a:headEnd/>
+            <a:tailEnd/>
+          </a:ln>
+        </p:spPr>
+      </p:pic>
+    </p:spTree>
+  </p:cSld>
+</p:sld>
+</file>
+
+<file path=ppt/slides/slide7.xml><?xml version="1.0" encoding="utf-8"?>
+<p:sld xmlns:a="http://schemas.openxmlformats.org/drawingml/2006/main" xmlns:r="http://schemas.openxmlformats.org/officeDocument/2006/relationships" xmlns:p="http://schemas.openxmlformats.org/presentationml/2006/main">
+  <p:cSld>
+    <p:spTree>
+      <p:nvGrpSpPr>
+        <p:cNvPr id="1" name=""/>
+        <p:cNvGrpSpPr/>
+        <p:nvPr/>
+      </p:nvGrpSpPr>
+      <p:grpSpPr>
+        <a:xfrm>
+          <a:off x="0" y="0"/>
+          <a:ext cx="0" cy="0"/>
+          <a:chOff x="0" y="0"/>
+          <a:chExt cx="0" cy="0"/>
+        </a:xfrm>
+      </p:grpSpPr>
+      <p:sp>
+        <p:nvSpPr>
+          <p:cNvPr id="3" name="Content Placeholder 2"/>
+          <p:cNvSpPr>
+            <a:spLocks noGrp="1"/>
+          </p:cNvSpPr>
+          <p:nvPr>
+            <p:ph idx="1"/>
+          </p:nvPr>
+        </p:nvSpPr>
+        <p:spPr/>
+        <p:txBody>
+          <a:bodyPr/>
+          <a:lstStyle/>
+          <a:p>
+            <a:pPr lvl="0" indent="0" marL="0">
+              <a:buNone/>
+            </a:pPr>
             <a:r>
               <a:rPr b="1"/>
-              <a:t>Render</a:t>
+              <a:t>El análisis de datos es una capacidad difícil de adquirir.</a:t>
             </a:r>
             <a:r>
               <a:rPr/>
-              <a:t> button a presentation will be generated that includes both content and the output of embedded code. You can embed code like this:</a:t>
-            </a:r>
-          </a:p>
-          <a:p>
-            <a:pPr lvl="0" indent="0">
-              <a:buNone/>
-            </a:pPr>
-            <a:r>
-              <a:rPr>
-                <a:latin typeface="Courier"/>
-              </a:rPr>
-              <a:t>[1] 2</a:t>
+              <a:t> Sin embargo, no es imposible, sino lo fundamental es irla practicando y como todo hacerla un hábito. Como lo vamos a lograr nosotros, con pequeños ejercicios y práctica, todos comenzaremos en nivel cero y de allí ir partiendo a un ritmo suave, para ir entendiendo la base del análisis de datos.</a:t>
             </a:r>
           </a:p>
         </p:txBody>

</xml_diff>